<commit_message>
oox smartart, linear layout: correctly scale spacings wrt constraints and rules
When constraints request a width which is larger than 100%, we scale
down. Then rules decide which children should be scaled down and which
ones stay as-is.

This commit adjusts the size of children which have no rule, but their
size has a constraint that they're a fraction of a scaled down child.

Change-Id: I0a007d82f49f18951215afb1bfe8c0f1328ecd41
Reviewed-on: https://gerrit.libreoffice.org/c/core/+/99875
Reviewed-by: Miklos Vajna <vmiklos@collabora.com>
Tested-by: Jenkins
</commit_message>
<xml_diff>
--- a/sd/qa/unit/data/pptx/smartart-linear-rule.pptx
+++ b/sd/qa/unit/data/pptx/smartart-linear-rule.pptx
@@ -1208,10 +1208,28 @@
     </dgm:shape>
     <dgm:presOf/>
     <dgm:constrLst>
+      <dgm:constr type="w" for="ch" forName="dummy" refType="w"/>
+      <dgm:constr type="h" for="ch" forName="dummy" refType="h"/>
+      <dgm:constr type="h" for="ch" forName="dummy" refType="w" refFor="ch" refForName="dummy" op="lte" fact="0.4"/>
+      <dgm:constr type="ctrX" for="ch" forName="dummy" refType="w" fact="0.5"/>
+      <dgm:constr type="ctrY" for="ch" forName="dummy" refType="h" fact="0.5"/>
       <dgm:constr type="w" for="ch" forName="linH" refType="w"/>
       <dgm:constr type="h" for="ch" forName="linH" refType="h"/>
+      <dgm:constr type="ctrX" for="ch" forName="linH" refType="w" fact="0.5"/>
+      <dgm:constr type="ctrY" for="ch" forName="linH" refType="h" fact="0.5"/>
+      <dgm:constr type="userP" for="ch" forName="linH" refType="h" refFor="ch" refForName="dummy" fact="0.25"/>
+      <dgm:constr type="userT" for="des" forName="parTx" refType="w" refFor="ch" refForName="dummy" fact="0.2"/>
     </dgm:constrLst>
     <dgm:ruleLst/>
+    <dgm:layoutNode name="dummy">
+      <dgm:alg type="sp"/>
+      <dgm:shape xmlns:r="http://schemas.openxmlformats.org/officeDocument/2006/relationships" r:blip="">
+        <dgm:adjLst/>
+      </dgm:shape>
+      <dgm:presOf/>
+      <dgm:constrLst/>
+      <dgm:ruleLst/>
+    </dgm:layoutNode>
     <dgm:layoutNode name="linH">
       <dgm:alg type="lin">
         <dgm:param type="linDir" val="fromL"/>
@@ -1223,19 +1241,36 @@
       <dgm:presOf/>
       <dgm:constrLst>
         <dgm:constr type="primFontSz" for="des" forName="parTx" val="65"/>
+        <dgm:constr type="primFontSz" for="des" forName="desTx" refType="primFontSz" refFor="des" refForName="parTx" op="equ"/>
+        <dgm:constr type="h" for="des" forName="parTx" refType="primFontSz" refFor="des" refForName="parTx"/>
+        <dgm:constr type="h" for="des" forName="desTx" refType="primFontSz" refFor="des" refForName="parTx" fact="0.5"/>
+        <dgm:constr type="h" for="des" forName="parTx" op="equ"/>
+        <dgm:constr type="h" for="des" forName="desTx" op="equ"/>
+        <dgm:constr type="h" for="ch" forName="backgroundArrow" refType="primFontSz" refFor="des" refForName="parTx" fact="2"/>
+        <dgm:constr type="h" for="ch" forName="backgroundArrow" refType="h" refFor="des" refForName="parTx" op="lte" fact="2"/>
+        <dgm:constr type="h" for="ch" forName="backgroundArrow" refType="h" refFor="des" refForName="parTx" op="gte" fact="2"/>
+        <dgm:constr type="h" for="des" forName="spVertical1" refType="primFontSz" refFor="des" refForName="parTx" fact="0.5"/>
+        <dgm:constr type="h" for="des" forName="spVertical1" refType="h" refFor="des" refForName="parTx" op="lte" fact="0.5"/>
+        <dgm:constr type="h" for="des" forName="spVertical1" refType="h" refFor="des" refForName="parTx" op="gte" fact="0.5"/>
+        <dgm:constr type="h" for="des" forName="spVertical2" refType="primFontSz" refFor="des" refForName="parTx" fact="0.5"/>
+        <dgm:constr type="h" for="des" forName="spVertical2" refType="h" refFor="des" refForName="parTx" op="lte" fact="0.5"/>
+        <dgm:constr type="h" for="des" forName="spVertical2" refType="h" refFor="des" refForName="parTx" op="gte" fact="0.5"/>
+        <dgm:constr type="h" for="des" forName="spVertical3" refType="primFontSz" refFor="des" refForName="parTx" fact="-0.4"/>
+        <dgm:constr type="h" for="des" forName="spVertical3" refType="h" refFor="des" refForName="parTx" op="lte" fact="-0.4"/>
+        <dgm:constr type="h" for="des" forName="spVertical3" refType="h" refFor="des" refForName="parTx" op="gte" fact="-0.4"/>
+        <dgm:constr type="w" for="ch" forName="backgroundArrow" refType="w"/>
+        <dgm:constr type="w" for="ch" forName="negArrow" refType="w" fact="-1"/>
+        <dgm:constr type="w" for="ch" forName="linV" refType="w"/>
+        <dgm:constr type="w" for="ch" forName="space" refType="w" refFor="ch" refForName="linV" fact="0.2"/>
         <dgm:constr type="w" for="ch" forName="padding1" refType="w" fact="0.08"/>
-        <dgm:constr type="w" for="ch" forName="linV" refType="w"/>
-        <dgm:constr type="h" for="des" forName="spVertical1" refType="primFontSz" refFor="des" refForName="parTx" fact="0.5"/>
-        <dgm:constr type="h" for="des" forName="parTx" refType="primFontSz" refFor="des" refForName="parTx"/>
-        <dgm:constr type="w" for="ch" forName="negArrow" refType="w" fact="-1"/>
-        <dgm:constr type="h" for="ch" forName="backgroundArrow" refType="h"/>
-        <dgm:constr type="w" for="ch" forName="backgroundArrow" refType="w"/>
+        <dgm:constr type="userP"/>
+        <dgm:constr type="w" for="ch" forName="padding2" refType="userP"/>
       </dgm:constrLst>
       <dgm:ruleLst>
         <dgm:rule type="w" for="ch" forName="linV" val="0" fact="NaN" max="NaN"/>
         <dgm:rule type="primFontSz" for="des" forName="parTx" val="5" fact="NaN" max="NaN"/>
       </dgm:ruleLst>
-      <dgm:layoutNode name="padding1">
+      <!--<dgm:layoutNode name="padding1">
         <dgm:alg type="sp"/>
         <dgm:shape xmlns:r="http://schemas.openxmlformats.org/officeDocument/2006/relationships" r:blip="">
           <dgm:adjLst/>
@@ -1243,7 +1278,7 @@
         <dgm:presOf/>
         <dgm:constrLst/>
         <dgm:ruleLst/>
-      </dgm:layoutNode>
+      </dgm:layoutNode>-->
       <dgm:forEach name="Name4" axis="ch" ptType="node">
         <dgm:layoutNode name="linV">
           <dgm:alg type="lin">
@@ -1256,6 +1291,9 @@
           <dgm:constrLst>
             <dgm:constr type="w" for="ch" forName="spVertical1" refType="w"/>
             <dgm:constr type="w" for="ch" forName="parTx" refType="w"/>
+            <dgm:constr type="w" for="ch" forName="spVertical2" refType="w"/>
+            <dgm:constr type="w" for="ch" forName="spVertical3" refType="w"/>
+            <dgm:constr type="w" for="ch" forName="desTx" refType="w"/>
           </dgm:constrLst>
           <dgm:ruleLst/>
           <dgm:layoutNode name="spVertical1">
@@ -1282,6 +1320,8 @@
             </dgm:shape>
             <dgm:presOf axis="self" ptType="node"/>
             <dgm:constrLst>
+              <dgm:constr type="userT"/>
+              <dgm:constr type="h" refType="userT" op="lte"/>
               <dgm:constr type="tMarg" refType="primFontSz" fact="0.8"/>
               <dgm:constr type="bMarg" refType="tMarg"/>
               <dgm:constr type="lMarg"/>
@@ -1291,8 +1331,72 @@
               <dgm:rule type="h" val="INF" fact="NaN" max="NaN"/>
             </dgm:ruleLst>
           </dgm:layoutNode>
+          <dgm:layoutNode name="spVertical2">
+            <dgm:alg type="sp"/>
+            <dgm:shape xmlns:r="http://schemas.openxmlformats.org/officeDocument/2006/relationships" r:blip="">
+              <dgm:adjLst/>
+            </dgm:shape>
+            <dgm:presOf/>
+            <dgm:constrLst/>
+            <dgm:ruleLst/>
+          </dgm:layoutNode>
+          <dgm:layoutNode name="spVertical3">
+            <dgm:alg type="sp"/>
+            <dgm:shape xmlns:r="http://schemas.openxmlformats.org/officeDocument/2006/relationships" r:blip="">
+              <dgm:adjLst/>
+            </dgm:shape>
+            <dgm:presOf/>
+            <dgm:constrLst/>
+            <dgm:ruleLst/>
+          </dgm:layoutNode>
+          <dgm:choose name="Name11">
+            <dgm:if name="Name12" axis="ch" ptType="node" func="cnt" op="gte" val="1">
+              <dgm:layoutNode name="desTx" styleLbl="revTx">
+                <dgm:varLst>
+                  <dgm:bulletEnabled val="1"/>
+                </dgm:varLst>
+                <dgm:alg type="tx">
+                  <dgm:param type="stBulletLvl" val="1"/>
+                </dgm:alg>
+                <dgm:shape xmlns:r="http://schemas.openxmlformats.org/officeDocument/2006/relationships" type="rect" r:blip="">
+                  <dgm:adjLst/>
+                </dgm:shape>
+                <dgm:presOf axis="des" ptType="node"/>
+                <dgm:constrLst>
+                  <dgm:constr type="tMarg"/>
+                  <dgm:constr type="bMarg"/>
+                  <dgm:constr type="rMarg"/>
+                  <dgm:constr type="lMarg"/>
+                </dgm:constrLst>
+                <dgm:ruleLst>
+                  <dgm:rule type="h" val="INF" fact="NaN" max="NaN"/>
+                </dgm:ruleLst>
+              </dgm:layoutNode>
+            </dgm:if>
+            <dgm:else name="Name13"/>
+          </dgm:choose>
         </dgm:layoutNode>
+        <dgm:forEach name="Name14" axis="followSib" ptType="sibTrans" cnt="1">
+          <dgm:layoutNode name="space">
+            <dgm:alg type="sp"/>
+            <dgm:shape xmlns:r="http://schemas.openxmlformats.org/officeDocument/2006/relationships" r:blip="">
+              <dgm:adjLst/>
+            </dgm:shape>
+            <dgm:presOf/>
+            <dgm:constrLst/>
+            <dgm:ruleLst/>
+          </dgm:layoutNode>
+        </dgm:forEach>
       </dgm:forEach>
+      <!--<dgm:layoutNode name="padding2">
+        <dgm:alg type="sp"/>
+        <dgm:shape xmlns:r="http://schemas.openxmlformats.org/officeDocument/2006/relationships" r:blip="">
+          <dgm:adjLst/>
+        </dgm:shape>
+        <dgm:presOf/>
+        <dgm:constrLst/>
+        <dgm:ruleLst/>
+      </dgm:layoutNode>-->
       <dgm:layoutNode name="negArrow">
         <dgm:alg type="sp"/>
         <dgm:shape xmlns:r="http://schemas.openxmlformats.org/officeDocument/2006/relationships" r:blip="">
@@ -5356,7 +5460,7 @@
           </p:nvPr>
         </p:nvGraphicFramePr>
         <p:xfrm>
-          <a:off x="1137600" y="1407600"/>
+          <a:off x="1137600" y="2847600"/>
           <a:ext cx="7152480" cy="3633120"/>
         </p:xfrm>
         <a:graphic>

</xml_diff>

<commit_message>
oox smartart, linear layout: fix scaling of spacing without rules
With this, finally the arrow shape has the correct horizontal position
and width, even if the markup is as complex as the PowerPoint UI
generates it (the previous version was a more minimal version).

Change-Id: I59f237c582053067e890180a1ae40471e5f46dea
Reviewed-on: https://gerrit.libreoffice.org/c/core/+/99894
Reviewed-by: Miklos Vajna <vmiklos@collabora.com>
Tested-by: Jenkins
</commit_message>
<xml_diff>
--- a/sd/qa/unit/data/pptx/smartart-linear-rule.pptx
+++ b/sd/qa/unit/data/pptx/smartart-linear-rule.pptx
@@ -1270,7 +1270,7 @@
         <dgm:rule type="w" for="ch" forName="linV" val="0" fact="NaN" max="NaN"/>
         <dgm:rule type="primFontSz" for="des" forName="parTx" val="5" fact="NaN" max="NaN"/>
       </dgm:ruleLst>
-      <!--<dgm:layoutNode name="padding1">
+      <dgm:layoutNode name="padding1">
         <dgm:alg type="sp"/>
         <dgm:shape xmlns:r="http://schemas.openxmlformats.org/officeDocument/2006/relationships" r:blip="">
           <dgm:adjLst/>
@@ -1278,7 +1278,7 @@
         <dgm:presOf/>
         <dgm:constrLst/>
         <dgm:ruleLst/>
-      </dgm:layoutNode>-->
+      </dgm:layoutNode>
       <dgm:forEach name="Name4" axis="ch" ptType="node">
         <dgm:layoutNode name="linV">
           <dgm:alg type="lin">
@@ -1388,7 +1388,7 @@
           </dgm:layoutNode>
         </dgm:forEach>
       </dgm:forEach>
-      <!--<dgm:layoutNode name="padding2">
+      <dgm:layoutNode name="padding2">
         <dgm:alg type="sp"/>
         <dgm:shape xmlns:r="http://schemas.openxmlformats.org/officeDocument/2006/relationships" r:blip="">
           <dgm:adjLst/>
@@ -1396,7 +1396,7 @@
         <dgm:presOf/>
         <dgm:constrLst/>
         <dgm:ruleLst/>
-      </dgm:layoutNode>-->
+      </dgm:layoutNode>
       <dgm:layoutNode name="negArrow">
         <dgm:alg type="sp"/>
         <dgm:shape xmlns:r="http://schemas.openxmlformats.org/officeDocument/2006/relationships" r:blip="">

</xml_diff>